<commit_message>
Update PPT + Class Diagram
</commit_message>
<xml_diff>
--- a/ASS 3 Document/ASS3_BIT302_E1700882_E1700873_PowerPoint.pptx
+++ b/ASS 3 Document/ASS3_BIT302_E1700882_E1700873_PowerPoint.pptx
@@ -8,12 +8,17 @@
   <p:sldIdLst>
     <p:sldId id="256" r:id="rId3"/>
     <p:sldId id="258" r:id="rId4"/>
-    <p:sldId id="259" r:id="rId5"/>
+    <p:sldId id="265" r:id="rId5"/>
     <p:sldId id="260" r:id="rId6"/>
     <p:sldId id="261" r:id="rId7"/>
     <p:sldId id="262" r:id="rId8"/>
     <p:sldId id="263" r:id="rId9"/>
     <p:sldId id="264" r:id="rId10"/>
+    <p:sldId id="266" r:id="rId11"/>
+    <p:sldId id="270" r:id="rId12"/>
+    <p:sldId id="267" r:id="rId13"/>
+    <p:sldId id="268" r:id="rId14"/>
+    <p:sldId id="269" r:id="rId15"/>
   </p:sldIdLst>
   <p:sldSz cx="12192000" cy="6858000"/>
   <p:notesSz cx="6858000" cy="9144000"/>
@@ -7247,7 +7252,7 @@
         <p:spPr>
           <a:xfrm>
             <a:off x="1561708" y="1872188"/>
-            <a:ext cx="9068586" cy="1785793"/>
+            <a:ext cx="9068586" cy="1909237"/>
           </a:xfrm>
         </p:spPr>
         <p:txBody>
@@ -7281,7 +7286,7 @@
         </p:nvSpPr>
         <p:spPr>
           <a:xfrm>
-            <a:off x="1447800" y="4333874"/>
+            <a:off x="1447800" y="4467224"/>
             <a:ext cx="9318106" cy="978789"/>
           </a:xfrm>
         </p:spPr>
@@ -7375,7 +7380,7 @@
         </p:nvSpPr>
         <p:spPr>
           <a:xfrm>
-            <a:off x="1447800" y="3514725"/>
+            <a:off x="1447800" y="3667125"/>
             <a:ext cx="9318106" cy="600075"/>
           </a:xfrm>
           <a:prstGeom prst="rect">
@@ -7629,6 +7634,355 @@
 </p:sld>
 </file>
 
+<file path=ppt/slides/slide10.xml><?xml version="1.0" encoding="utf-8"?>
+<p:sld xmlns:a="http://schemas.openxmlformats.org/drawingml/2006/main" xmlns:r="http://schemas.openxmlformats.org/officeDocument/2006/relationships" xmlns:p="http://schemas.openxmlformats.org/presentationml/2006/main">
+  <p:cSld>
+    <p:spTree>
+      <p:nvGrpSpPr>
+        <p:cNvPr id="1" name=""/>
+        <p:cNvGrpSpPr/>
+        <p:nvPr/>
+      </p:nvGrpSpPr>
+      <p:grpSpPr>
+        <a:xfrm>
+          <a:off x="0" y="0"/>
+          <a:ext cx="0" cy="0"/>
+          <a:chOff x="0" y="0"/>
+          <a:chExt cx="0" cy="0"/>
+        </a:xfrm>
+      </p:grpSpPr>
+      <p:sp>
+        <p:nvSpPr>
+          <p:cNvPr id="2" name="Title 1"/>
+          <p:cNvSpPr>
+            <a:spLocks noGrp="1"/>
+          </p:cNvSpPr>
+          <p:nvPr>
+            <p:ph type="title"/>
+          </p:nvPr>
+        </p:nvSpPr>
+        <p:spPr/>
+        <p:txBody>
+          <a:bodyPr/>
+          <a:lstStyle/>
+          <a:p>
+            <a:r>
+              <a:rPr lang="en-US" dirty="0" smtClean="0"/>
+              <a:t>Trello</a:t>
+            </a:r>
+            <a:endParaRPr lang="en-US" dirty="0"/>
+          </a:p>
+        </p:txBody>
+      </p:sp>
+      <p:sp>
+        <p:nvSpPr>
+          <p:cNvPr id="3" name="Content Placeholder 2"/>
+          <p:cNvSpPr>
+            <a:spLocks noGrp="1"/>
+          </p:cNvSpPr>
+          <p:nvPr>
+            <p:ph idx="1"/>
+          </p:nvPr>
+        </p:nvSpPr>
+        <p:spPr/>
+        <p:txBody>
+          <a:bodyPr/>
+          <a:lstStyle/>
+          <a:p>
+            <a:endParaRPr lang="en-US"/>
+          </a:p>
+        </p:txBody>
+      </p:sp>
+    </p:spTree>
+    <p:extLst>
+      <p:ext uri="{BB962C8B-B14F-4D97-AF65-F5344CB8AC3E}">
+        <p14:creationId xmlns:p14="http://schemas.microsoft.com/office/powerpoint/2010/main" val="1554552504"/>
+      </p:ext>
+    </p:extLst>
+  </p:cSld>
+  <p:clrMapOvr>
+    <a:masterClrMapping/>
+  </p:clrMapOvr>
+  <mc:AlternateContent xmlns:mc="http://schemas.openxmlformats.org/markup-compatibility/2006" xmlns:p14="http://schemas.microsoft.com/office/powerpoint/2010/main">
+    <mc:Choice Requires="p14">
+      <p:transition p14:dur="250">
+        <p:fade/>
+      </p:transition>
+    </mc:Choice>
+    <mc:Fallback xmlns="">
+      <p:transition>
+        <p:fade/>
+      </p:transition>
+    </mc:Fallback>
+  </mc:AlternateContent>
+</p:sld>
+</file>
+
+<file path=ppt/slides/slide11.xml><?xml version="1.0" encoding="utf-8"?>
+<p:sld xmlns:a="http://schemas.openxmlformats.org/drawingml/2006/main" xmlns:r="http://schemas.openxmlformats.org/officeDocument/2006/relationships" xmlns:p="http://schemas.openxmlformats.org/presentationml/2006/main">
+  <p:cSld>
+    <p:spTree>
+      <p:nvGrpSpPr>
+        <p:cNvPr id="1" name=""/>
+        <p:cNvGrpSpPr/>
+        <p:nvPr/>
+      </p:nvGrpSpPr>
+      <p:grpSpPr>
+        <a:xfrm>
+          <a:off x="0" y="0"/>
+          <a:ext cx="0" cy="0"/>
+          <a:chOff x="0" y="0"/>
+          <a:chExt cx="0" cy="0"/>
+        </a:xfrm>
+      </p:grpSpPr>
+      <p:sp>
+        <p:nvSpPr>
+          <p:cNvPr id="2" name="Title 1"/>
+          <p:cNvSpPr>
+            <a:spLocks noGrp="1"/>
+          </p:cNvSpPr>
+          <p:nvPr>
+            <p:ph type="title"/>
+          </p:nvPr>
+        </p:nvSpPr>
+        <p:spPr/>
+        <p:txBody>
+          <a:bodyPr/>
+          <a:lstStyle/>
+          <a:p>
+            <a:endParaRPr lang="en-US" dirty="0"/>
+          </a:p>
+        </p:txBody>
+      </p:sp>
+      <p:pic>
+        <p:nvPicPr>
+          <p:cNvPr id="4" name="Content Placeholder 3"/>
+          <p:cNvPicPr>
+            <a:picLocks noGrp="1" noChangeAspect="1"/>
+          </p:cNvPicPr>
+          <p:nvPr>
+            <p:ph idx="1"/>
+          </p:nvPr>
+        </p:nvPicPr>
+        <p:blipFill rotWithShape="1">
+          <a:blip r:embed="rId2"/>
+          <a:srcRect t="18605" b="5423"/>
+          <a:stretch/>
+        </p:blipFill>
+        <p:spPr>
+          <a:xfrm>
+            <a:off x="0" y="642594"/>
+            <a:ext cx="12192000" cy="5843931"/>
+          </a:xfrm>
+          <a:prstGeom prst="rect">
+            <a:avLst/>
+          </a:prstGeom>
+        </p:spPr>
+      </p:pic>
+    </p:spTree>
+    <p:extLst>
+      <p:ext uri="{BB962C8B-B14F-4D97-AF65-F5344CB8AC3E}">
+        <p14:creationId xmlns:p14="http://schemas.microsoft.com/office/powerpoint/2010/main" val="77744869"/>
+      </p:ext>
+    </p:extLst>
+  </p:cSld>
+  <p:clrMapOvr>
+    <a:masterClrMapping/>
+  </p:clrMapOvr>
+  <mc:AlternateContent xmlns:mc="http://schemas.openxmlformats.org/markup-compatibility/2006" xmlns:p14="http://schemas.microsoft.com/office/powerpoint/2010/main">
+    <mc:Choice Requires="p14">
+      <p:transition p14:dur="250">
+        <p:fade/>
+      </p:transition>
+    </mc:Choice>
+    <mc:Fallback xmlns="">
+      <p:transition>
+        <p:fade/>
+      </p:transition>
+    </mc:Fallback>
+  </mc:AlternateContent>
+  <p:timing>
+    <p:tnLst>
+      <p:par>
+        <p:cTn id="1" dur="indefinite" restart="never" nodeType="tmRoot"/>
+      </p:par>
+    </p:tnLst>
+  </p:timing>
+</p:sld>
+</file>
+
+<file path=ppt/slides/slide12.xml><?xml version="1.0" encoding="utf-8"?>
+<p:sld xmlns:a="http://schemas.openxmlformats.org/drawingml/2006/main" xmlns:r="http://schemas.openxmlformats.org/officeDocument/2006/relationships" xmlns:p="http://schemas.openxmlformats.org/presentationml/2006/main">
+  <p:cSld>
+    <p:spTree>
+      <p:nvGrpSpPr>
+        <p:cNvPr id="1" name=""/>
+        <p:cNvGrpSpPr/>
+        <p:nvPr/>
+      </p:nvGrpSpPr>
+      <p:grpSpPr>
+        <a:xfrm>
+          <a:off x="0" y="0"/>
+          <a:ext cx="0" cy="0"/>
+          <a:chOff x="0" y="0"/>
+          <a:chExt cx="0" cy="0"/>
+        </a:xfrm>
+      </p:grpSpPr>
+      <p:sp>
+        <p:nvSpPr>
+          <p:cNvPr id="2" name="Title 1"/>
+          <p:cNvSpPr>
+            <a:spLocks noGrp="1"/>
+          </p:cNvSpPr>
+          <p:nvPr>
+            <p:ph type="title"/>
+          </p:nvPr>
+        </p:nvSpPr>
+        <p:spPr/>
+        <p:txBody>
+          <a:bodyPr/>
+          <a:lstStyle/>
+          <a:p>
+            <a:endParaRPr lang="en-US"/>
+          </a:p>
+        </p:txBody>
+      </p:sp>
+      <p:pic>
+        <p:nvPicPr>
+          <p:cNvPr id="5" name="Content Placeholder 4"/>
+          <p:cNvPicPr>
+            <a:picLocks noGrp="1" noChangeAspect="1"/>
+          </p:cNvPicPr>
+          <p:nvPr>
+            <p:ph idx="1"/>
+          </p:nvPr>
+        </p:nvPicPr>
+        <p:blipFill rotWithShape="1">
+          <a:blip r:embed="rId2"/>
+          <a:srcRect t="18890" b="5278"/>
+          <a:stretch/>
+        </p:blipFill>
+        <p:spPr>
+          <a:xfrm>
+            <a:off x="0" y="1295401"/>
+            <a:ext cx="12192000" cy="5200650"/>
+          </a:xfrm>
+          <a:prstGeom prst="rect">
+            <a:avLst/>
+          </a:prstGeom>
+        </p:spPr>
+      </p:pic>
+    </p:spTree>
+    <p:extLst>
+      <p:ext uri="{BB962C8B-B14F-4D97-AF65-F5344CB8AC3E}">
+        <p14:creationId xmlns:p14="http://schemas.microsoft.com/office/powerpoint/2010/main" val="2452672409"/>
+      </p:ext>
+    </p:extLst>
+  </p:cSld>
+  <p:clrMapOvr>
+    <a:masterClrMapping/>
+  </p:clrMapOvr>
+  <mc:AlternateContent xmlns:mc="http://schemas.openxmlformats.org/markup-compatibility/2006" xmlns:p14="http://schemas.microsoft.com/office/powerpoint/2010/main">
+    <mc:Choice Requires="p14">
+      <p:transition p14:dur="250">
+        <p:fade/>
+      </p:transition>
+    </mc:Choice>
+    <mc:Fallback xmlns="">
+      <p:transition>
+        <p:fade/>
+      </p:transition>
+    </mc:Fallback>
+  </mc:AlternateContent>
+</p:sld>
+</file>
+
+<file path=ppt/slides/slide13.xml><?xml version="1.0" encoding="utf-8"?>
+<p:sld xmlns:a="http://schemas.openxmlformats.org/drawingml/2006/main" xmlns:r="http://schemas.openxmlformats.org/officeDocument/2006/relationships" xmlns:p="http://schemas.openxmlformats.org/presentationml/2006/main">
+  <p:cSld>
+    <p:spTree>
+      <p:nvGrpSpPr>
+        <p:cNvPr id="1" name=""/>
+        <p:cNvGrpSpPr/>
+        <p:nvPr/>
+      </p:nvGrpSpPr>
+      <p:grpSpPr>
+        <a:xfrm>
+          <a:off x="0" y="0"/>
+          <a:ext cx="0" cy="0"/>
+          <a:chOff x="0" y="0"/>
+          <a:chExt cx="0" cy="0"/>
+        </a:xfrm>
+      </p:grpSpPr>
+      <p:sp>
+        <p:nvSpPr>
+          <p:cNvPr id="2" name="Title 1"/>
+          <p:cNvSpPr>
+            <a:spLocks noGrp="1"/>
+          </p:cNvSpPr>
+          <p:nvPr>
+            <p:ph type="title"/>
+          </p:nvPr>
+        </p:nvSpPr>
+        <p:spPr/>
+        <p:txBody>
+          <a:bodyPr/>
+          <a:lstStyle/>
+          <a:p>
+            <a:endParaRPr lang="en-US"/>
+          </a:p>
+        </p:txBody>
+      </p:sp>
+      <p:pic>
+        <p:nvPicPr>
+          <p:cNvPr id="5" name="Content Placeholder 4"/>
+          <p:cNvPicPr>
+            <a:picLocks noGrp="1" noChangeAspect="1"/>
+          </p:cNvPicPr>
+          <p:nvPr>
+            <p:ph idx="1"/>
+          </p:nvPr>
+        </p:nvPicPr>
+        <p:blipFill rotWithShape="1">
+          <a:blip r:embed="rId2"/>
+          <a:srcRect t="17967" b="5989"/>
+          <a:stretch/>
+        </p:blipFill>
+        <p:spPr>
+          <a:xfrm>
+            <a:off x="0" y="1228725"/>
+            <a:ext cx="12192000" cy="5200650"/>
+          </a:xfrm>
+          <a:prstGeom prst="rect">
+            <a:avLst/>
+          </a:prstGeom>
+        </p:spPr>
+      </p:pic>
+    </p:spTree>
+    <p:extLst>
+      <p:ext uri="{BB962C8B-B14F-4D97-AF65-F5344CB8AC3E}">
+        <p14:creationId xmlns:p14="http://schemas.microsoft.com/office/powerpoint/2010/main" val="1431115944"/>
+      </p:ext>
+    </p:extLst>
+  </p:cSld>
+  <p:clrMapOvr>
+    <a:masterClrMapping/>
+  </p:clrMapOvr>
+  <mc:AlternateContent xmlns:mc="http://schemas.openxmlformats.org/markup-compatibility/2006" xmlns:p14="http://schemas.microsoft.com/office/powerpoint/2010/main">
+    <mc:Choice Requires="p14">
+      <p:transition p14:dur="250">
+        <p:fade/>
+      </p:transition>
+    </mc:Choice>
+    <mc:Fallback xmlns="">
+      <p:transition>
+        <p:fade/>
+      </p:transition>
+    </mc:Fallback>
+  </mc:AlternateContent>
+</p:sld>
+</file>
+
 <file path=ppt/slides/slide2.xml><?xml version="1.0" encoding="utf-8"?>
 <p:sld xmlns:a="http://schemas.openxmlformats.org/drawingml/2006/main" xmlns:r="http://schemas.openxmlformats.org/officeDocument/2006/relationships" xmlns:p="http://schemas.openxmlformats.org/presentationml/2006/main">
   <p:cSld>
@@ -7658,14 +8012,15 @@
         </p:nvSpPr>
         <p:spPr>
           <a:xfrm>
-            <a:off x="813816" y="578586"/>
-            <a:ext cx="10789920" cy="1371600"/>
+            <a:off x="381000" y="428626"/>
+            <a:ext cx="11430000" cy="1333500"/>
           </a:xfrm>
         </p:spPr>
         <p:txBody>
           <a:bodyPr/>
           <a:lstStyle/>
           <a:p>
+            <a:pPr algn="ctr"/>
             <a:r>
               <a:rPr lang="en-US" dirty="0" smtClean="0"/>
               <a:t>FUNCTIONAL REQUIREMENT</a:t>
@@ -7686,8 +8041,8 @@
         </p:nvSpPr>
         <p:spPr>
           <a:xfrm>
-            <a:off x="813816" y="1929384"/>
-            <a:ext cx="10789920" cy="4105656"/>
+            <a:off x="590550" y="1685925"/>
+            <a:ext cx="11013186" cy="4733925"/>
           </a:xfrm>
         </p:spPr>
         <p:txBody>
@@ -7696,130 +8051,75 @@
           </a:bodyPr>
           <a:lstStyle/>
           <a:p>
-            <a:pPr marL="0" indent="0">
+            <a:pPr marL="0" indent="0" algn="ctr">
               <a:buNone/>
             </a:pPr>
             <a:r>
-              <a:rPr lang="en-US" b="1" dirty="0" err="1"/>
-              <a:t>HousingOfficer</a:t>
-            </a:r>
-            <a:r>
-              <a:rPr lang="en-US" b="1" dirty="0"/>
+              <a:rPr lang="en-US" sz="3600" b="1" dirty="0" smtClean="0"/>
+              <a:t>Housing Officer</a:t>
+            </a:r>
+          </a:p>
+          <a:p>
+            <a:pPr marL="0" indent="0" algn="ctr">
+              <a:buNone/>
+            </a:pPr>
+            <a:endParaRPr lang="en-US" sz="800" dirty="0" smtClean="0"/>
+          </a:p>
+          <a:p>
+            <a:pPr lvl="0"/>
+            <a:r>
+              <a:rPr lang="en-US" sz="2800" dirty="0" smtClean="0"/>
+              <a:t>Login / Logout System</a:t>
+            </a:r>
+            <a:endParaRPr lang="en-US" sz="2800" dirty="0" smtClean="0"/>
+          </a:p>
+          <a:p>
+            <a:pPr lvl="0"/>
+            <a:r>
+              <a:rPr lang="en-US" sz="2800" dirty="0" smtClean="0"/>
+              <a:t>Change / Reset Password</a:t>
+            </a:r>
+          </a:p>
+          <a:p>
+            <a:pPr lvl="0"/>
+            <a:r>
+              <a:rPr lang="en-US" sz="2800" dirty="0" smtClean="0"/>
+              <a:t>View, Edit, and Delete for Applicant Object</a:t>
+            </a:r>
+          </a:p>
+          <a:p>
+            <a:pPr lvl="0"/>
+            <a:r>
+              <a:rPr lang="en-US" sz="2800" dirty="0" smtClean="0"/>
+              <a:t>Basic CRUD (Create, Read, Update, Delete) for Application Object</a:t>
+            </a:r>
+          </a:p>
+          <a:p>
+            <a:pPr lvl="0"/>
+            <a:r>
+              <a:rPr lang="en-US" sz="2800" dirty="0" smtClean="0"/>
+              <a:t>Add, View, and Edit for Residence Object</a:t>
+            </a:r>
+          </a:p>
+          <a:p>
+            <a:pPr lvl="0"/>
+            <a:r>
+              <a:rPr lang="en-US" sz="2800" dirty="0" smtClean="0"/>
+              <a:t>Add(Allocate), View,</a:t>
+            </a:r>
+            <a:r>
+              <a:rPr lang="en-US" sz="2800" dirty="0" smtClean="0"/>
               <a:t> </a:t>
             </a:r>
             <a:r>
-              <a:rPr lang="en-US" b="1" dirty="0" smtClean="0"/>
-              <a:t>requirement</a:t>
-            </a:r>
-            <a:endParaRPr lang="en-US" dirty="0" smtClean="0"/>
-          </a:p>
-          <a:p>
-            <a:pPr lvl="0"/>
-            <a:r>
-              <a:rPr lang="en-US" dirty="0" err="1" smtClean="0"/>
-              <a:t>HousingOfficer</a:t>
-            </a:r>
-            <a:r>
-              <a:rPr lang="en-US" dirty="0" smtClean="0"/>
-              <a:t> has login menu that can be filled with user ID and password to go directly to </a:t>
-            </a:r>
-            <a:r>
-              <a:rPr lang="en-US" dirty="0" err="1" smtClean="0"/>
-              <a:t>HousingOfficer</a:t>
-            </a:r>
-            <a:r>
-              <a:rPr lang="en-US" dirty="0" smtClean="0"/>
-              <a:t> homepage.</a:t>
-            </a:r>
-          </a:p>
-          <a:p>
-            <a:pPr lvl="0"/>
-            <a:r>
-              <a:rPr lang="en-US" dirty="0" err="1" smtClean="0"/>
-              <a:t>HousingOfficer</a:t>
-            </a:r>
-            <a:r>
-              <a:rPr lang="en-US" dirty="0" smtClean="0"/>
-              <a:t> </a:t>
-            </a:r>
-            <a:r>
-              <a:rPr lang="en-US" dirty="0"/>
-              <a:t>can change the password if </a:t>
-            </a:r>
-            <a:r>
-              <a:rPr lang="en-US" dirty="0" err="1"/>
-              <a:t>HousingOfficer</a:t>
-            </a:r>
-            <a:r>
-              <a:rPr lang="en-US" dirty="0"/>
-              <a:t> forget their password.</a:t>
-            </a:r>
-          </a:p>
-          <a:p>
-            <a:pPr lvl="0"/>
-            <a:r>
-              <a:rPr lang="en-US" dirty="0" err="1"/>
-              <a:t>HousingOfficer</a:t>
-            </a:r>
-            <a:r>
-              <a:rPr lang="en-US" dirty="0"/>
-              <a:t> must have “edit menu” which is can edit residence detail.</a:t>
-            </a:r>
-          </a:p>
-          <a:p>
-            <a:pPr lvl="0"/>
-            <a:r>
-              <a:rPr lang="en-US" dirty="0" err="1"/>
-              <a:t>HousingOfficer</a:t>
-            </a:r>
-            <a:r>
-              <a:rPr lang="en-US" dirty="0"/>
-              <a:t> must have “add menu” which is can set up new residence.</a:t>
-            </a:r>
-          </a:p>
-          <a:p>
-            <a:pPr lvl="0"/>
-            <a:r>
-              <a:rPr lang="en-US" dirty="0" err="1"/>
-              <a:t>HousingOfficer</a:t>
-            </a:r>
-            <a:r>
-              <a:rPr lang="en-US" dirty="0"/>
-              <a:t> must have “delete menu” which is can delete applicant and residence detail.</a:t>
-            </a:r>
-          </a:p>
-          <a:p>
-            <a:pPr lvl="0"/>
-            <a:r>
-              <a:rPr lang="en-US" dirty="0" err="1"/>
-              <a:t>HousingOfficer</a:t>
-            </a:r>
-            <a:r>
-              <a:rPr lang="en-US" dirty="0"/>
-              <a:t> must have “view menu” which is can view applications and residence details.</a:t>
-            </a:r>
-          </a:p>
-          <a:p>
-            <a:pPr lvl="0"/>
-            <a:r>
-              <a:rPr lang="en-US" dirty="0"/>
-              <a:t>Payment menu to display payment details for applicant, which is designed by </a:t>
-            </a:r>
-            <a:r>
-              <a:rPr lang="en-US" dirty="0" err="1"/>
-              <a:t>HousingOfficer</a:t>
-            </a:r>
-            <a:r>
-              <a:rPr lang="en-US" dirty="0"/>
-              <a:t>.</a:t>
-            </a:r>
-          </a:p>
-          <a:p>
-            <a:pPr lvl="0"/>
-            <a:r>
-              <a:rPr lang="en-US" dirty="0"/>
-              <a:t>Logout Menu to exit from the application.</a:t>
-            </a:r>
+              <a:rPr lang="en-US" sz="2800" dirty="0" smtClean="0"/>
+              <a:t>and</a:t>
+            </a:r>
+            <a:r>
+              <a:rPr lang="en-US" sz="2800" dirty="0" smtClean="0"/>
+              <a:t> Delete for Allocation Object </a:t>
+            </a:r>
+            <a:endParaRPr lang="en-US" sz="2800" dirty="0"/>
           </a:p>
         </p:txBody>
       </p:sp>
@@ -7884,14 +8184,15 @@
         </p:nvSpPr>
         <p:spPr>
           <a:xfrm>
-            <a:off x="813816" y="578586"/>
-            <a:ext cx="10789920" cy="1371600"/>
+            <a:off x="381000" y="428626"/>
+            <a:ext cx="11430000" cy="1333500"/>
           </a:xfrm>
         </p:spPr>
         <p:txBody>
           <a:bodyPr/>
           <a:lstStyle/>
           <a:p>
+            <a:pPr algn="ctr"/>
             <a:r>
               <a:rPr lang="en-US" dirty="0" smtClean="0"/>
               <a:t>FUNCTIONAL REQUIREMENT</a:t>
@@ -7912,8 +8213,8 @@
         </p:nvSpPr>
         <p:spPr>
           <a:xfrm>
-            <a:off x="813816" y="1929384"/>
-            <a:ext cx="10789920" cy="4105656"/>
+            <a:off x="813816" y="1685925"/>
+            <a:ext cx="10789920" cy="4733925"/>
           </a:xfrm>
         </p:spPr>
         <p:txBody>
@@ -7922,52 +8223,54 @@
           </a:bodyPr>
           <a:lstStyle/>
           <a:p>
-            <a:pPr marL="0" indent="0">
+            <a:pPr marL="0" indent="0" algn="ctr">
               <a:buNone/>
             </a:pPr>
             <a:r>
-              <a:rPr lang="en-US" sz="2000" b="1" dirty="0"/>
-              <a:t>Applicant </a:t>
-            </a:r>
-            <a:r>
-              <a:rPr lang="en-US" sz="2000" b="1" dirty="0" smtClean="0"/>
-              <a:t>Requirement</a:t>
-            </a:r>
-            <a:endParaRPr lang="en-US" sz="2000" dirty="0"/>
+              <a:rPr lang="en-US" sz="3600" b="1" dirty="0" smtClean="0"/>
+              <a:t>Applicant</a:t>
+            </a:r>
+          </a:p>
+          <a:p>
+            <a:pPr marL="0" indent="0" algn="ctr">
+              <a:buNone/>
+            </a:pPr>
+            <a:endParaRPr lang="en-US" dirty="0" smtClean="0"/>
           </a:p>
           <a:p>
             <a:pPr lvl="0"/>
             <a:r>
-              <a:rPr lang="en-US" sz="2000" dirty="0"/>
-              <a:t>Applicant will register where the form has been given.</a:t>
+              <a:rPr lang="en-US" sz="2800" dirty="0" smtClean="0"/>
+              <a:t>Login / Logout System</a:t>
             </a:r>
           </a:p>
           <a:p>
             <a:pPr lvl="0"/>
             <a:r>
-              <a:rPr lang="en-US" sz="2000" dirty="0"/>
-              <a:t>Applicant has login menu that can be filled with user ID and password so that the applicant can access the system without confusion, and will be directed to the home page.</a:t>
-            </a:r>
+              <a:rPr lang="en-US" sz="2800" dirty="0" smtClean="0"/>
+              <a:t>Sign Up</a:t>
+            </a:r>
+            <a:endParaRPr lang="en-US" sz="2800" dirty="0" smtClean="0"/>
           </a:p>
           <a:p>
             <a:pPr lvl="0"/>
             <a:r>
-              <a:rPr lang="en-US" sz="2000" dirty="0"/>
-              <a:t>Applicant can change the password if applicant forget their password.</a:t>
+              <a:rPr lang="en-US" sz="2800" dirty="0" smtClean="0"/>
+              <a:t>Change / Reset Password</a:t>
             </a:r>
           </a:p>
           <a:p>
             <a:pPr lvl="0"/>
             <a:r>
-              <a:rPr lang="en-US" sz="2000" dirty="0"/>
-              <a:t>The system has a menu with buttons or icons that applicants can choose from view application, view residences, wish list, submit applications and payment.</a:t>
+              <a:rPr lang="en-US" sz="2800" dirty="0" smtClean="0"/>
+              <a:t>Add(Submit) &amp; View for Application Object</a:t>
             </a:r>
           </a:p>
           <a:p>
             <a:pPr lvl="0"/>
             <a:r>
-              <a:rPr lang="en-US" sz="2000" dirty="0"/>
-              <a:t>Logout Menu to exit from the application.</a:t>
+              <a:rPr lang="en-US" sz="2800" dirty="0" smtClean="0"/>
+              <a:t>View for Residence Object</a:t>
             </a:r>
           </a:p>
         </p:txBody>
@@ -7975,7 +8278,7 @@
     </p:spTree>
     <p:extLst>
       <p:ext uri="{BB962C8B-B14F-4D97-AF65-F5344CB8AC3E}">
-        <p14:creationId xmlns:p14="http://schemas.microsoft.com/office/powerpoint/2010/main" val="852284921"/>
+        <p14:creationId xmlns:p14="http://schemas.microsoft.com/office/powerpoint/2010/main" val="1493916766"/>
       </p:ext>
     </p:extLst>
   </p:cSld>
@@ -8033,14 +8336,15 @@
         </p:nvSpPr>
         <p:spPr>
           <a:xfrm>
-            <a:off x="813816" y="578586"/>
-            <a:ext cx="10789920" cy="1371600"/>
+            <a:off x="380999" y="388086"/>
+            <a:ext cx="11420475" cy="1371600"/>
           </a:xfrm>
         </p:spPr>
         <p:txBody>
           <a:bodyPr/>
           <a:lstStyle/>
           <a:p>
+            <a:pPr algn="ctr"/>
             <a:r>
               <a:rPr lang="en-US" dirty="0" smtClean="0"/>
               <a:t>NON-FUNCTIONAL REQUIREMENT</a:t>
@@ -8056,12 +8360,16 @@
             <a:graphicFrameLocks noGrp="1"/>
           </p:cNvGraphicFramePr>
           <p:nvPr>
-            <p:extLst/>
+            <p:extLst>
+              <p:ext uri="{D42A27DB-BD31-4B8C-83A1-F6EECF244321}">
+                <p14:modId xmlns:p14="http://schemas.microsoft.com/office/powerpoint/2010/main" val="2733108731"/>
+              </p:ext>
+            </p:extLst>
           </p:nvPr>
         </p:nvGraphicFramePr>
         <p:xfrm>
-          <a:off x="1971040" y="1950186"/>
-          <a:ext cx="8128000" cy="4028440"/>
+          <a:off x="676275" y="1759686"/>
+          <a:ext cx="10848975" cy="4560450"/>
         </p:xfrm>
         <a:graphic>
           <a:graphicData uri="http://schemas.openxmlformats.org/drawingml/2006/table">
@@ -8070,14 +8378,14 @@
                 <a:tableStyleId>{5C22544A-7EE6-4342-B048-85BDC9FD1C3A}</a:tableStyleId>
               </a:tblPr>
               <a:tblGrid>
-                <a:gridCol w="2247392">
+                <a:gridCol w="2999742">
                   <a:extLst>
                     <a:ext uri="{9D8B030D-6E8A-4147-A177-3AD203B41FA5}">
                       <a16:colId xmlns:a16="http://schemas.microsoft.com/office/drawing/2014/main" val="1867946181"/>
                     </a:ext>
                   </a:extLst>
                 </a:gridCol>
-                <a:gridCol w="5880608">
+                <a:gridCol w="7849233">
                   <a:extLst>
                     <a:ext uri="{9D8B030D-6E8A-4147-A177-3AD203B41FA5}">
                       <a16:colId xmlns:a16="http://schemas.microsoft.com/office/drawing/2014/main" val="1094547991"/>
@@ -8085,7 +8393,7 @@
                   </a:extLst>
                 </a:gridCol>
               </a:tblGrid>
-              <a:tr h="370840">
+              <a:tr h="409571">
                 <a:tc>
                   <a:txBody>
                     <a:bodyPr/>
@@ -8093,10 +8401,10 @@
                     <a:p>
                       <a:pPr algn="ctr"/>
                       <a:r>
-                        <a:rPr lang="en-US" dirty="0" smtClean="0"/>
+                        <a:rPr lang="en-US" sz="2600" dirty="0" smtClean="0"/>
                         <a:t>Requirement</a:t>
                       </a:r>
-                      <a:endParaRPr lang="en-US" dirty="0"/>
+                      <a:endParaRPr lang="en-US" sz="2600" dirty="0"/>
                     </a:p>
                   </a:txBody>
                   <a:tcPr/>
@@ -8108,10 +8416,10 @@
                     <a:p>
                       <a:pPr algn="ctr"/>
                       <a:r>
-                        <a:rPr lang="en-US" dirty="0" smtClean="0"/>
+                        <a:rPr lang="en-US" sz="2600" dirty="0" smtClean="0"/>
                         <a:t>Description</a:t>
                       </a:r>
-                      <a:endParaRPr lang="en-US" dirty="0"/>
+                      <a:endParaRPr lang="en-US" sz="2600" dirty="0"/>
                     </a:p>
                   </a:txBody>
                   <a:tcPr/>
@@ -8122,7 +8430,7 @@
                   </a:ext>
                 </a:extLst>
               </a:tr>
-              <a:tr h="370840">
+              <a:tr h="688243">
                 <a:tc>
                   <a:txBody>
                     <a:bodyPr/>
@@ -8130,10 +8438,10 @@
                     <a:p>
                       <a:pPr algn="ctr"/>
                       <a:r>
-                        <a:rPr lang="en-US" b="1" dirty="0" smtClean="0"/>
+                        <a:rPr lang="en-US" sz="2600" b="1" dirty="0" smtClean="0"/>
                         <a:t>Security requirement</a:t>
                       </a:r>
-                      <a:endParaRPr lang="en-US" dirty="0"/>
+                      <a:endParaRPr lang="en-US" sz="2600" dirty="0"/>
                     </a:p>
                   </a:txBody>
                   <a:tcPr/>
@@ -8161,12 +8469,30 @@
                         <a:defRPr/>
                       </a:pPr>
                       <a:r>
-                        <a:rPr lang="en-US" dirty="0" smtClean="0"/>
-                        <a:t>Using login system for authorization to prevent unauthorized access of certain parties.</a:t>
+                        <a:rPr lang="en-US" sz="2600" dirty="0" smtClean="0"/>
+                        <a:t>Using login </a:t>
                       </a:r>
-                    </a:p>
-                    <a:p>
-                      <a:endParaRPr lang="en-US" dirty="0"/>
+                      <a:r>
+                        <a:rPr lang="en-US" sz="2600" dirty="0" smtClean="0"/>
+                        <a:t>system, session</a:t>
+                      </a:r>
+                      <a:r>
+                        <a:rPr lang="en-US" sz="2600" baseline="0" dirty="0" smtClean="0"/>
+                        <a:t> &amp; framework middleware</a:t>
+                      </a:r>
+                      <a:r>
+                        <a:rPr lang="en-US" sz="2600" dirty="0" smtClean="0"/>
+                        <a:t> </a:t>
+                      </a:r>
+                      <a:r>
+                        <a:rPr lang="en-US" sz="2600" dirty="0" smtClean="0"/>
+                        <a:t>for authorization to prevent unauthorized access of certain parties</a:t>
+                      </a:r>
+                      <a:r>
+                        <a:rPr lang="en-US" sz="2600" dirty="0" smtClean="0"/>
+                        <a:t>.</a:t>
+                      </a:r>
+                      <a:endParaRPr lang="en-US" sz="2600" dirty="0" smtClean="0"/>
                     </a:p>
                   </a:txBody>
                   <a:tcPr/>
@@ -8177,7 +8503,7 @@
                   </a:ext>
                 </a:extLst>
               </a:tr>
-              <a:tr h="370840">
+              <a:tr h="749203">
                 <a:tc>
                   <a:txBody>
                     <a:bodyPr/>
@@ -8185,10 +8511,10 @@
                     <a:p>
                       <a:pPr algn="ctr"/>
                       <a:r>
-                        <a:rPr lang="en-US" b="1" dirty="0" smtClean="0"/>
+                        <a:rPr lang="en-US" sz="2600" b="1" dirty="0" smtClean="0"/>
                         <a:t>Usability</a:t>
                       </a:r>
-                      <a:endParaRPr lang="en-US" dirty="0"/>
+                      <a:endParaRPr lang="en-US" sz="2600" dirty="0"/>
                     </a:p>
                   </a:txBody>
                   <a:tcPr/>
@@ -8216,12 +8542,14 @@
                         <a:defRPr/>
                       </a:pPr>
                       <a:r>
-                        <a:rPr lang="en-US" dirty="0" smtClean="0"/>
-                        <a:t>The system should be easy to access for Housing Officer and Applicant.</a:t>
+                        <a:rPr lang="en-US" sz="2600" dirty="0" smtClean="0"/>
+                        <a:t>The system should be easy to access for Housing Officer and Applicant</a:t>
                       </a:r>
-                    </a:p>
-                    <a:p>
-                      <a:endParaRPr lang="en-US" dirty="0"/>
+                      <a:r>
+                        <a:rPr lang="en-US" sz="2600" dirty="0" smtClean="0"/>
+                        <a:t>.</a:t>
+                      </a:r>
+                      <a:endParaRPr lang="en-US" sz="2600" dirty="0"/>
                     </a:p>
                   </a:txBody>
                   <a:tcPr/>
@@ -8232,7 +8560,7 @@
                   </a:ext>
                 </a:extLst>
               </a:tr>
-              <a:tr h="370840">
+              <a:tr h="685800">
                 <a:tc>
                   <a:txBody>
                     <a:bodyPr/>
@@ -8240,10 +8568,10 @@
                     <a:p>
                       <a:pPr algn="ctr"/>
                       <a:r>
-                        <a:rPr lang="en-US" b="1" dirty="0" smtClean="0"/>
+                        <a:rPr lang="en-US" sz="2600" b="1" dirty="0" smtClean="0"/>
                         <a:t>Integrity</a:t>
                       </a:r>
-                      <a:endParaRPr lang="en-US" dirty="0"/>
+                      <a:endParaRPr lang="en-US" sz="2600" dirty="0"/>
                     </a:p>
                   </a:txBody>
                   <a:tcPr/>
@@ -8271,12 +8599,22 @@
                         <a:defRPr/>
                       </a:pPr>
                       <a:r>
-                        <a:rPr lang="en-US" dirty="0" smtClean="0"/>
-                        <a:t>Data inside the system will be keep as it is untampered and unharmed.</a:t>
+                        <a:rPr lang="en-US" sz="2600" dirty="0" smtClean="0"/>
+                        <a:t>Data inside the system will be keep as it </a:t>
                       </a:r>
-                    </a:p>
-                    <a:p>
-                      <a:endParaRPr lang="en-US" dirty="0"/>
+                      <a:r>
+                        <a:rPr lang="en-US" sz="2600" dirty="0" smtClean="0"/>
+                        <a:t>is, </a:t>
+                      </a:r>
+                      <a:r>
+                        <a:rPr lang="en-US" sz="2600" dirty="0" smtClean="0"/>
+                        <a:t>untampered and unharmed</a:t>
+                      </a:r>
+                      <a:r>
+                        <a:rPr lang="en-US" sz="2600" dirty="0" smtClean="0"/>
+                        <a:t>.</a:t>
+                      </a:r>
+                      <a:endParaRPr lang="en-US" sz="2600" dirty="0" smtClean="0"/>
                     </a:p>
                   </a:txBody>
                   <a:tcPr/>
@@ -8287,7 +8625,7 @@
                   </a:ext>
                 </a:extLst>
               </a:tr>
-              <a:tr h="370840">
+              <a:tr h="1024770">
                 <a:tc>
                   <a:txBody>
                     <a:bodyPr/>
@@ -8295,10 +8633,10 @@
                     <a:p>
                       <a:pPr algn="ctr"/>
                       <a:r>
-                        <a:rPr lang="en-US" b="1" dirty="0" smtClean="0"/>
+                        <a:rPr lang="en-US" sz="2600" b="1" dirty="0" smtClean="0"/>
                         <a:t>Modifiability</a:t>
                       </a:r>
-                      <a:endParaRPr lang="en-US" dirty="0"/>
+                      <a:endParaRPr lang="en-US" sz="2600" dirty="0"/>
                     </a:p>
                   </a:txBody>
                   <a:tcPr/>
@@ -8326,20 +8664,18 @@
                         <a:defRPr/>
                       </a:pPr>
                       <a:r>
-                        <a:rPr lang="en-US" dirty="0" smtClean="0"/>
+                        <a:rPr lang="en-US" sz="2600" dirty="0" smtClean="0"/>
                         <a:t>Data can only be change by authorized user (</a:t>
                       </a:r>
                       <a:r>
-                        <a:rPr lang="en-US" dirty="0" err="1" smtClean="0"/>
+                        <a:rPr lang="en-US" sz="2600" dirty="0" err="1" smtClean="0"/>
                         <a:t>HousingOfficer</a:t>
                       </a:r>
                       <a:r>
-                        <a:rPr lang="en-US" dirty="0" smtClean="0"/>
+                        <a:rPr lang="en-US" sz="2600" dirty="0" smtClean="0"/>
                         <a:t>).</a:t>
                       </a:r>
-                    </a:p>
-                    <a:p>
-                      <a:endParaRPr lang="en-US" dirty="0"/>
+                      <a:endParaRPr lang="en-US" sz="2600" dirty="0" smtClean="0"/>
                     </a:p>
                   </a:txBody>
                   <a:tcPr/>
@@ -8433,29 +8769,6 @@
           </a:p>
         </p:txBody>
       </p:sp>
-      <p:pic>
-        <p:nvPicPr>
-          <p:cNvPr id="7" name="Picture 6"/>
-          <p:cNvPicPr>
-            <a:picLocks noChangeAspect="1"/>
-          </p:cNvPicPr>
-          <p:nvPr/>
-        </p:nvPicPr>
-        <p:blipFill rotWithShape="1">
-          <a:blip r:embed="rId2"/>
-          <a:srcRect b="5555"/>
-          <a:stretch/>
-        </p:blipFill>
-        <p:spPr>
-          <a:xfrm>
-            <a:off x="381000" y="1225296"/>
-            <a:ext cx="11475720" cy="5236464"/>
-          </a:xfrm>
-          <a:prstGeom prst="rect">
-            <a:avLst/>
-          </a:prstGeom>
-        </p:spPr>
-      </p:pic>
     </p:spTree>
     <p:extLst>
       <p:ext uri="{BB962C8B-B14F-4D97-AF65-F5344CB8AC3E}">
@@ -8505,31 +8818,6 @@
           <a:chExt cx="0" cy="0"/>
         </a:xfrm>
       </p:grpSpPr>
-      <p:pic>
-        <p:nvPicPr>
-          <p:cNvPr id="4" name="Content Placeholder 3"/>
-          <p:cNvPicPr>
-            <a:picLocks noGrp="1" noChangeAspect="1"/>
-          </p:cNvPicPr>
-          <p:nvPr>
-            <p:ph idx="1"/>
-          </p:nvPr>
-        </p:nvPicPr>
-        <p:blipFill rotWithShape="1">
-          <a:blip r:embed="rId2"/>
-          <a:srcRect b="5700"/>
-          <a:stretch/>
-        </p:blipFill>
-        <p:spPr>
-          <a:xfrm>
-            <a:off x="365760" y="1225296"/>
-            <a:ext cx="11470640" cy="5216145"/>
-          </a:xfrm>
-          <a:prstGeom prst="rect">
-            <a:avLst/>
-          </a:prstGeom>
-        </p:spPr>
-      </p:pic>
       <p:sp>
         <p:nvSpPr>
           <p:cNvPr id="5" name="Title 1"/>
@@ -8557,6 +8845,25 @@
               <a:t>Gantt Chart</a:t>
             </a:r>
             <a:endParaRPr lang="en-US" sz="4000" dirty="0"/>
+          </a:p>
+        </p:txBody>
+      </p:sp>
+      <p:sp>
+        <p:nvSpPr>
+          <p:cNvPr id="2" name="Content Placeholder 1"/>
+          <p:cNvSpPr>
+            <a:spLocks noGrp="1"/>
+          </p:cNvSpPr>
+          <p:nvPr>
+            <p:ph idx="1"/>
+          </p:nvPr>
+        </p:nvSpPr>
+        <p:spPr/>
+        <p:txBody>
+          <a:bodyPr/>
+          <a:lstStyle/>
+          <a:p>
+            <a:endParaRPr lang="en-US"/>
           </a:p>
         </p:txBody>
       </p:sp>
@@ -8729,7 +9036,7 @@
             <a:pPr algn="ctr"/>
             <a:r>
               <a:rPr lang="en-US" sz="8000" dirty="0" smtClean="0"/>
-              <a:t>USE CASE</a:t>
+              <a:t>Updated Use Case</a:t>
             </a:r>
             <a:endParaRPr lang="en-US" sz="8000" dirty="0"/>
           </a:p>
@@ -8739,6 +9046,93 @@
     <p:extLst>
       <p:ext uri="{BB962C8B-B14F-4D97-AF65-F5344CB8AC3E}">
         <p14:creationId xmlns:p14="http://schemas.microsoft.com/office/powerpoint/2010/main" val="307318607"/>
+      </p:ext>
+    </p:extLst>
+  </p:cSld>
+  <p:clrMapOvr>
+    <a:masterClrMapping/>
+  </p:clrMapOvr>
+  <mc:AlternateContent xmlns:mc="http://schemas.openxmlformats.org/markup-compatibility/2006" xmlns:p14="http://schemas.microsoft.com/office/powerpoint/2010/main">
+    <mc:Choice Requires="p14">
+      <p:transition p14:dur="250">
+        <p:fade/>
+      </p:transition>
+    </mc:Choice>
+    <mc:Fallback xmlns="">
+      <p:transition>
+        <p:fade/>
+      </p:transition>
+    </mc:Fallback>
+  </mc:AlternateContent>
+  <p:timing>
+    <p:tnLst>
+      <p:par>
+        <p:cTn id="1" dur="indefinite" restart="never" nodeType="tmRoot"/>
+      </p:par>
+    </p:tnLst>
+  </p:timing>
+</p:sld>
+</file>
+
+<file path=ppt/slides/slide9.xml><?xml version="1.0" encoding="utf-8"?>
+<p:sld xmlns:a="http://schemas.openxmlformats.org/drawingml/2006/main" xmlns:r="http://schemas.openxmlformats.org/officeDocument/2006/relationships" xmlns:p="http://schemas.openxmlformats.org/presentationml/2006/main">
+  <p:cSld>
+    <p:spTree>
+      <p:nvGrpSpPr>
+        <p:cNvPr id="1" name=""/>
+        <p:cNvGrpSpPr/>
+        <p:nvPr/>
+      </p:nvGrpSpPr>
+      <p:grpSpPr>
+        <a:xfrm>
+          <a:off x="0" y="0"/>
+          <a:ext cx="0" cy="0"/>
+          <a:chOff x="0" y="0"/>
+          <a:chExt cx="0" cy="0"/>
+        </a:xfrm>
+      </p:grpSpPr>
+      <p:sp>
+        <p:nvSpPr>
+          <p:cNvPr id="2" name="Title 1"/>
+          <p:cNvSpPr>
+            <a:spLocks noGrp="1"/>
+          </p:cNvSpPr>
+          <p:nvPr>
+            <p:ph type="title"/>
+          </p:nvPr>
+        </p:nvSpPr>
+        <p:spPr/>
+        <p:txBody>
+          <a:bodyPr/>
+          <a:lstStyle/>
+          <a:p>
+            <a:endParaRPr lang="en-US"/>
+          </a:p>
+        </p:txBody>
+      </p:sp>
+      <p:sp>
+        <p:nvSpPr>
+          <p:cNvPr id="3" name="Content Placeholder 2"/>
+          <p:cNvSpPr>
+            <a:spLocks noGrp="1"/>
+          </p:cNvSpPr>
+          <p:nvPr>
+            <p:ph idx="1"/>
+          </p:nvPr>
+        </p:nvSpPr>
+        <p:spPr/>
+        <p:txBody>
+          <a:bodyPr/>
+          <a:lstStyle/>
+          <a:p>
+            <a:endParaRPr lang="en-US"/>
+          </a:p>
+        </p:txBody>
+      </p:sp>
+    </p:spTree>
+    <p:extLst>
+      <p:ext uri="{BB962C8B-B14F-4D97-AF65-F5344CB8AC3E}">
+        <p14:creationId xmlns:p14="http://schemas.microsoft.com/office/powerpoint/2010/main" val="2512293396"/>
       </p:ext>
     </p:extLst>
   </p:cSld>

</xml_diff>